<commit_message>
animations added to präse
</commit_message>
<xml_diff>
--- a/präse/Team Brustkrebs.pptx
+++ b/präse/Team Brustkrebs.pptx
@@ -3032,6 +3032,13 @@
   <p:clrMapOvr>
     <a:masterClrMapping/>
   </p:clrMapOvr>
+  <p:timing>
+    <p:tnLst>
+      <p:par>
+        <p:cTn id="1" dur="indefinite" restart="never" nodeType="tmRoot"/>
+      </p:par>
+    </p:tnLst>
+  </p:timing>
 </p:sld>
 </file>
 
@@ -3108,6 +3115,13 @@
   <p:clrMapOvr>
     <a:masterClrMapping/>
   </p:clrMapOvr>
+  <p:timing>
+    <p:tnLst>
+      <p:par>
+        <p:cTn id="1" dur="indefinite" restart="never" nodeType="tmRoot"/>
+      </p:par>
+    </p:tnLst>
+  </p:timing>
 </p:sld>
 </file>
 
@@ -3275,6 +3289,147 @@
   <p:clrMapOvr>
     <a:masterClrMapping/>
   </p:clrMapOvr>
+  <p:timing>
+    <p:tnLst>
+      <p:par>
+        <p:cTn id="1" dur="indefinite" restart="never" nodeType="tmRoot">
+          <p:childTnLst>
+            <p:seq concurrent="1" nextAc="seek">
+              <p:cTn id="2" dur="indefinite" nodeType="mainSeq">
+                <p:childTnLst>
+                  <p:par>
+                    <p:cTn id="3" fill="hold">
+                      <p:stCondLst>
+                        <p:cond delay="indefinite"/>
+                      </p:stCondLst>
+                      <p:childTnLst>
+                        <p:par>
+                          <p:cTn id="4" fill="hold">
+                            <p:stCondLst>
+                              <p:cond delay="0"/>
+                            </p:stCondLst>
+                            <p:childTnLst>
+                              <p:par>
+                                <p:cTn id="5" presetID="1" presetClass="entr" presetSubtype="0" fill="hold" nodeType="clickEffect">
+                                  <p:stCondLst>
+                                    <p:cond delay="0"/>
+                                  </p:stCondLst>
+                                  <p:childTnLst>
+                                    <p:set>
+                                      <p:cBhvr>
+                                        <p:cTn id="6" dur="1" fill="hold">
+                                          <p:stCondLst>
+                                            <p:cond delay="0"/>
+                                          </p:stCondLst>
+                                        </p:cTn>
+                                        <p:tgtEl>
+                                          <p:spTgt spid="3">
+                                            <p:txEl>
+                                              <p:pRg st="4" end="4"/>
+                                            </p:txEl>
+                                          </p:spTgt>
+                                        </p:tgtEl>
+                                        <p:attrNameLst>
+                                          <p:attrName>style.visibility</p:attrName>
+                                        </p:attrNameLst>
+                                      </p:cBhvr>
+                                      <p:to>
+                                        <p:strVal val="visible"/>
+                                      </p:to>
+                                    </p:set>
+                                  </p:childTnLst>
+                                </p:cTn>
+                              </p:par>
+                              <p:par>
+                                <p:cTn id="7" presetID="1" presetClass="entr" presetSubtype="0" fill="hold" nodeType="withEffect">
+                                  <p:stCondLst>
+                                    <p:cond delay="0"/>
+                                  </p:stCondLst>
+                                  <p:childTnLst>
+                                    <p:set>
+                                      <p:cBhvr>
+                                        <p:cTn id="8" dur="1" fill="hold">
+                                          <p:stCondLst>
+                                            <p:cond delay="0"/>
+                                          </p:stCondLst>
+                                        </p:cTn>
+                                        <p:tgtEl>
+                                          <p:spTgt spid="3">
+                                            <p:txEl>
+                                              <p:pRg st="5" end="5"/>
+                                            </p:txEl>
+                                          </p:spTgt>
+                                        </p:tgtEl>
+                                        <p:attrNameLst>
+                                          <p:attrName>style.visibility</p:attrName>
+                                        </p:attrNameLst>
+                                      </p:cBhvr>
+                                      <p:to>
+                                        <p:strVal val="visible"/>
+                                      </p:to>
+                                    </p:set>
+                                  </p:childTnLst>
+                                </p:cTn>
+                              </p:par>
+                              <p:par>
+                                <p:cTn id="9" presetID="1" presetClass="entr" presetSubtype="0" fill="hold" nodeType="withEffect">
+                                  <p:stCondLst>
+                                    <p:cond delay="0"/>
+                                  </p:stCondLst>
+                                  <p:childTnLst>
+                                    <p:set>
+                                      <p:cBhvr>
+                                        <p:cTn id="10" dur="1" fill="hold">
+                                          <p:stCondLst>
+                                            <p:cond delay="0"/>
+                                          </p:stCondLst>
+                                        </p:cTn>
+                                        <p:tgtEl>
+                                          <p:spTgt spid="3">
+                                            <p:txEl>
+                                              <p:pRg st="6" end="6"/>
+                                            </p:txEl>
+                                          </p:spTgt>
+                                        </p:tgtEl>
+                                        <p:attrNameLst>
+                                          <p:attrName>style.visibility</p:attrName>
+                                        </p:attrNameLst>
+                                      </p:cBhvr>
+                                      <p:to>
+                                        <p:strVal val="visible"/>
+                                      </p:to>
+                                    </p:set>
+                                  </p:childTnLst>
+                                </p:cTn>
+                              </p:par>
+                            </p:childTnLst>
+                          </p:cTn>
+                        </p:par>
+                      </p:childTnLst>
+                    </p:cTn>
+                  </p:par>
+                </p:childTnLst>
+              </p:cTn>
+              <p:prevCondLst>
+                <p:cond evt="onPrev" delay="0">
+                  <p:tgtEl>
+                    <p:sldTgt/>
+                  </p:tgtEl>
+                </p:cond>
+              </p:prevCondLst>
+              <p:nextCondLst>
+                <p:cond evt="onNext" delay="0">
+                  <p:tgtEl>
+                    <p:sldTgt/>
+                  </p:tgtEl>
+                </p:cond>
+              </p:nextCondLst>
+            </p:seq>
+          </p:childTnLst>
+        </p:cTn>
+      </p:par>
+    </p:tnLst>
+  </p:timing>
 </p:sld>
 </file>
 
@@ -3331,7 +3486,7 @@
         </p:nvSpPr>
         <p:spPr>
           <a:xfrm>
-            <a:off x="7432059" y="1690688"/>
+            <a:off x="4908259" y="1690688"/>
             <a:ext cx="3921741" cy="4351338"/>
           </a:xfrm>
         </p:spPr>
@@ -3451,7 +3606,7 @@
         </p:blipFill>
         <p:spPr>
           <a:xfrm>
-            <a:off x="131619" y="1491906"/>
+            <a:off x="-2392181" y="1491906"/>
             <a:ext cx="6992326" cy="5601482"/>
           </a:xfrm>
           <a:prstGeom prst="rect">
@@ -3469,6 +3624,241 @@
   <p:clrMapOvr>
     <a:masterClrMapping/>
   </p:clrMapOvr>
+  <p:timing>
+    <p:tnLst>
+      <p:par>
+        <p:cTn id="1" dur="indefinite" restart="never" nodeType="tmRoot">
+          <p:childTnLst>
+            <p:seq concurrent="1" nextAc="seek">
+              <p:cTn id="2" dur="indefinite" nodeType="mainSeq">
+                <p:childTnLst>
+                  <p:par>
+                    <p:cTn id="3" fill="hold">
+                      <p:stCondLst>
+                        <p:cond delay="indefinite"/>
+                      </p:stCondLst>
+                      <p:childTnLst>
+                        <p:par>
+                          <p:cTn id="4" fill="hold">
+                            <p:stCondLst>
+                              <p:cond delay="0"/>
+                            </p:stCondLst>
+                            <p:childTnLst>
+                              <p:par>
+                                <p:cTn id="5" presetID="1" presetClass="entr" presetSubtype="0" fill="hold" nodeType="clickEffect">
+                                  <p:stCondLst>
+                                    <p:cond delay="0"/>
+                                  </p:stCondLst>
+                                  <p:childTnLst>
+                                    <p:set>
+                                      <p:cBhvr>
+                                        <p:cTn id="6" dur="1" fill="hold">
+                                          <p:stCondLst>
+                                            <p:cond delay="0"/>
+                                          </p:stCondLst>
+                                        </p:cTn>
+                                        <p:tgtEl>
+                                          <p:spTgt spid="7">
+                                            <p:txEl>
+                                              <p:pRg st="0" end="0"/>
+                                            </p:txEl>
+                                          </p:spTgt>
+                                        </p:tgtEl>
+                                        <p:attrNameLst>
+                                          <p:attrName>style.visibility</p:attrName>
+                                        </p:attrNameLst>
+                                      </p:cBhvr>
+                                      <p:to>
+                                        <p:strVal val="visible"/>
+                                      </p:to>
+                                    </p:set>
+                                  </p:childTnLst>
+                                </p:cTn>
+                              </p:par>
+                              <p:par>
+                                <p:cTn id="7" presetID="1" presetClass="entr" presetSubtype="0" fill="hold" nodeType="withEffect">
+                                  <p:stCondLst>
+                                    <p:cond delay="0"/>
+                                  </p:stCondLst>
+                                  <p:childTnLst>
+                                    <p:set>
+                                      <p:cBhvr>
+                                        <p:cTn id="8" dur="1" fill="hold">
+                                          <p:stCondLst>
+                                            <p:cond delay="0"/>
+                                          </p:stCondLst>
+                                        </p:cTn>
+                                        <p:tgtEl>
+                                          <p:spTgt spid="7">
+                                            <p:txEl>
+                                              <p:pRg st="1" end="1"/>
+                                            </p:txEl>
+                                          </p:spTgt>
+                                        </p:tgtEl>
+                                        <p:attrNameLst>
+                                          <p:attrName>style.visibility</p:attrName>
+                                        </p:attrNameLst>
+                                      </p:cBhvr>
+                                      <p:to>
+                                        <p:strVal val="visible"/>
+                                      </p:to>
+                                    </p:set>
+                                  </p:childTnLst>
+                                </p:cTn>
+                              </p:par>
+                              <p:par>
+                                <p:cTn id="9" presetID="1" presetClass="entr" presetSubtype="0" fill="hold" nodeType="withEffect">
+                                  <p:stCondLst>
+                                    <p:cond delay="0"/>
+                                  </p:stCondLst>
+                                  <p:childTnLst>
+                                    <p:set>
+                                      <p:cBhvr>
+                                        <p:cTn id="10" dur="1" fill="hold">
+                                          <p:stCondLst>
+                                            <p:cond delay="0"/>
+                                          </p:stCondLst>
+                                        </p:cTn>
+                                        <p:tgtEl>
+                                          <p:spTgt spid="8"/>
+                                        </p:tgtEl>
+                                        <p:attrNameLst>
+                                          <p:attrName>style.visibility</p:attrName>
+                                        </p:attrNameLst>
+                                      </p:cBhvr>
+                                      <p:to>
+                                        <p:strVal val="visible"/>
+                                      </p:to>
+                                    </p:set>
+                                  </p:childTnLst>
+                                </p:cTn>
+                              </p:par>
+                            </p:childTnLst>
+                          </p:cTn>
+                        </p:par>
+                      </p:childTnLst>
+                    </p:cTn>
+                  </p:par>
+                  <p:par>
+                    <p:cTn id="11" fill="hold">
+                      <p:stCondLst>
+                        <p:cond delay="indefinite"/>
+                      </p:stCondLst>
+                      <p:childTnLst>
+                        <p:par>
+                          <p:cTn id="12" fill="hold">
+                            <p:stCondLst>
+                              <p:cond delay="0"/>
+                            </p:stCondLst>
+                            <p:childTnLst>
+                              <p:par>
+                                <p:cTn id="13" presetID="1" presetClass="entr" presetSubtype="0" fill="hold" nodeType="clickEffect">
+                                  <p:stCondLst>
+                                    <p:cond delay="0"/>
+                                  </p:stCondLst>
+                                  <p:childTnLst>
+                                    <p:set>
+                                      <p:cBhvr>
+                                        <p:cTn id="14" dur="1" fill="hold">
+                                          <p:stCondLst>
+                                            <p:cond delay="0"/>
+                                          </p:stCondLst>
+                                        </p:cTn>
+                                        <p:tgtEl>
+                                          <p:spTgt spid="7">
+                                            <p:txEl>
+                                              <p:pRg st="3" end="3"/>
+                                            </p:txEl>
+                                          </p:spTgt>
+                                        </p:tgtEl>
+                                        <p:attrNameLst>
+                                          <p:attrName>style.visibility</p:attrName>
+                                        </p:attrNameLst>
+                                      </p:cBhvr>
+                                      <p:to>
+                                        <p:strVal val="visible"/>
+                                      </p:to>
+                                    </p:set>
+                                  </p:childTnLst>
+                                </p:cTn>
+                              </p:par>
+                            </p:childTnLst>
+                          </p:cTn>
+                        </p:par>
+                      </p:childTnLst>
+                    </p:cTn>
+                  </p:par>
+                  <p:par>
+                    <p:cTn id="15" fill="hold">
+                      <p:stCondLst>
+                        <p:cond delay="indefinite"/>
+                      </p:stCondLst>
+                      <p:childTnLst>
+                        <p:par>
+                          <p:cTn id="16" fill="hold">
+                            <p:stCondLst>
+                              <p:cond delay="0"/>
+                            </p:stCondLst>
+                            <p:childTnLst>
+                              <p:par>
+                                <p:cTn id="17" presetID="1" presetClass="entr" presetSubtype="0" fill="hold" nodeType="clickEffect">
+                                  <p:stCondLst>
+                                    <p:cond delay="0"/>
+                                  </p:stCondLst>
+                                  <p:childTnLst>
+                                    <p:set>
+                                      <p:cBhvr>
+                                        <p:cTn id="18" dur="1" fill="hold">
+                                          <p:stCondLst>
+                                            <p:cond delay="0"/>
+                                          </p:stCondLst>
+                                        </p:cTn>
+                                        <p:tgtEl>
+                                          <p:spTgt spid="7">
+                                            <p:txEl>
+                                              <p:pRg st="5" end="5"/>
+                                            </p:txEl>
+                                          </p:spTgt>
+                                        </p:tgtEl>
+                                        <p:attrNameLst>
+                                          <p:attrName>style.visibility</p:attrName>
+                                        </p:attrNameLst>
+                                      </p:cBhvr>
+                                      <p:to>
+                                        <p:strVal val="visible"/>
+                                      </p:to>
+                                    </p:set>
+                                  </p:childTnLst>
+                                </p:cTn>
+                              </p:par>
+                            </p:childTnLst>
+                          </p:cTn>
+                        </p:par>
+                      </p:childTnLst>
+                    </p:cTn>
+                  </p:par>
+                </p:childTnLst>
+              </p:cTn>
+              <p:prevCondLst>
+                <p:cond evt="onPrev" delay="0">
+                  <p:tgtEl>
+                    <p:sldTgt/>
+                  </p:tgtEl>
+                </p:cond>
+              </p:prevCondLst>
+              <p:nextCondLst>
+                <p:cond evt="onNext" delay="0">
+                  <p:tgtEl>
+                    <p:sldTgt/>
+                  </p:tgtEl>
+                </p:cond>
+              </p:nextCondLst>
+            </p:seq>
+          </p:childTnLst>
+        </p:cTn>
+      </p:par>
+    </p:tnLst>
+  </p:timing>
 </p:sld>
 </file>
 
@@ -3553,6 +3943,13 @@
   <p:clrMapOvr>
     <a:masterClrMapping/>
   </p:clrMapOvr>
+  <p:timing>
+    <p:tnLst>
+      <p:par>
+        <p:cTn id="1" dur="indefinite" restart="never" nodeType="tmRoot"/>
+      </p:par>
+    </p:tnLst>
+  </p:timing>
 </p:sld>
 </file>
 
@@ -3729,6 +4126,232 @@
   <p:clrMapOvr>
     <a:masterClrMapping/>
   </p:clrMapOvr>
+  <p:timing>
+    <p:tnLst>
+      <p:par>
+        <p:cTn id="1" dur="indefinite" restart="never" nodeType="tmRoot">
+          <p:childTnLst>
+            <p:seq concurrent="1" nextAc="seek">
+              <p:cTn id="2" dur="indefinite" nodeType="mainSeq">
+                <p:childTnLst>
+                  <p:par>
+                    <p:cTn id="3" fill="hold">
+                      <p:stCondLst>
+                        <p:cond delay="indefinite"/>
+                      </p:stCondLst>
+                      <p:childTnLst>
+                        <p:par>
+                          <p:cTn id="4" fill="hold">
+                            <p:stCondLst>
+                              <p:cond delay="0"/>
+                            </p:stCondLst>
+                            <p:childTnLst>
+                              <p:par>
+                                <p:cTn id="5" presetID="1" presetClass="entr" presetSubtype="0" fill="hold" nodeType="clickEffect">
+                                  <p:stCondLst>
+                                    <p:cond delay="0"/>
+                                  </p:stCondLst>
+                                  <p:childTnLst>
+                                    <p:set>
+                                      <p:cBhvr>
+                                        <p:cTn id="6" dur="1" fill="hold">
+                                          <p:stCondLst>
+                                            <p:cond delay="0"/>
+                                          </p:stCondLst>
+                                        </p:cTn>
+                                        <p:tgtEl>
+                                          <p:spTgt spid="3">
+                                            <p:txEl>
+                                              <p:pRg st="3" end="3"/>
+                                            </p:txEl>
+                                          </p:spTgt>
+                                        </p:tgtEl>
+                                        <p:attrNameLst>
+                                          <p:attrName>style.visibility</p:attrName>
+                                        </p:attrNameLst>
+                                      </p:cBhvr>
+                                      <p:to>
+                                        <p:strVal val="visible"/>
+                                      </p:to>
+                                    </p:set>
+                                  </p:childTnLst>
+                                </p:cTn>
+                              </p:par>
+                            </p:childTnLst>
+                          </p:cTn>
+                        </p:par>
+                      </p:childTnLst>
+                    </p:cTn>
+                  </p:par>
+                  <p:par>
+                    <p:cTn id="7" fill="hold">
+                      <p:stCondLst>
+                        <p:cond delay="indefinite"/>
+                      </p:stCondLst>
+                      <p:childTnLst>
+                        <p:par>
+                          <p:cTn id="8" fill="hold">
+                            <p:stCondLst>
+                              <p:cond delay="0"/>
+                            </p:stCondLst>
+                            <p:childTnLst>
+                              <p:par>
+                                <p:cTn id="9" presetID="1" presetClass="entr" presetSubtype="0" fill="hold" nodeType="clickEffect">
+                                  <p:stCondLst>
+                                    <p:cond delay="0"/>
+                                  </p:stCondLst>
+                                  <p:childTnLst>
+                                    <p:set>
+                                      <p:cBhvr>
+                                        <p:cTn id="10" dur="1" fill="hold">
+                                          <p:stCondLst>
+                                            <p:cond delay="0"/>
+                                          </p:stCondLst>
+                                        </p:cTn>
+                                        <p:tgtEl>
+                                          <p:spTgt spid="3">
+                                            <p:txEl>
+                                              <p:pRg st="4" end="4"/>
+                                            </p:txEl>
+                                          </p:spTgt>
+                                        </p:tgtEl>
+                                        <p:attrNameLst>
+                                          <p:attrName>style.visibility</p:attrName>
+                                        </p:attrNameLst>
+                                      </p:cBhvr>
+                                      <p:to>
+                                        <p:strVal val="visible"/>
+                                      </p:to>
+                                    </p:set>
+                                  </p:childTnLst>
+                                </p:cTn>
+                              </p:par>
+                            </p:childTnLst>
+                          </p:cTn>
+                        </p:par>
+                      </p:childTnLst>
+                    </p:cTn>
+                  </p:par>
+                  <p:par>
+                    <p:cTn id="11" fill="hold">
+                      <p:stCondLst>
+                        <p:cond delay="indefinite"/>
+                      </p:stCondLst>
+                      <p:childTnLst>
+                        <p:par>
+                          <p:cTn id="12" fill="hold">
+                            <p:stCondLst>
+                              <p:cond delay="0"/>
+                            </p:stCondLst>
+                            <p:childTnLst>
+                              <p:par>
+                                <p:cTn id="13" presetID="1" presetClass="entr" presetSubtype="0" fill="hold" nodeType="clickEffect">
+                                  <p:stCondLst>
+                                    <p:cond delay="0"/>
+                                  </p:stCondLst>
+                                  <p:childTnLst>
+                                    <p:set>
+                                      <p:cBhvr>
+                                        <p:cTn id="14" dur="1" fill="hold">
+                                          <p:stCondLst>
+                                            <p:cond delay="0"/>
+                                          </p:stCondLst>
+                                        </p:cTn>
+                                        <p:tgtEl>
+                                          <p:spTgt spid="3">
+                                            <p:txEl>
+                                              <p:pRg st="5" end="5"/>
+                                            </p:txEl>
+                                          </p:spTgt>
+                                        </p:tgtEl>
+                                        <p:attrNameLst>
+                                          <p:attrName>style.visibility</p:attrName>
+                                        </p:attrNameLst>
+                                      </p:cBhvr>
+                                      <p:to>
+                                        <p:strVal val="visible"/>
+                                      </p:to>
+                                    </p:set>
+                                  </p:childTnLst>
+                                </p:cTn>
+                              </p:par>
+                            </p:childTnLst>
+                          </p:cTn>
+                        </p:par>
+                      </p:childTnLst>
+                    </p:cTn>
+                  </p:par>
+                  <p:par>
+                    <p:cTn id="15" fill="hold">
+                      <p:stCondLst>
+                        <p:cond delay="indefinite"/>
+                      </p:stCondLst>
+                      <p:childTnLst>
+                        <p:par>
+                          <p:cTn id="16" fill="hold">
+                            <p:stCondLst>
+                              <p:cond delay="0"/>
+                            </p:stCondLst>
+                            <p:childTnLst>
+                              <p:par>
+                                <p:cTn id="17" presetID="1" presetClass="entr" presetSubtype="0" fill="hold" nodeType="clickEffect">
+                                  <p:stCondLst>
+                                    <p:cond delay="0"/>
+                                  </p:stCondLst>
+                                  <p:childTnLst>
+                                    <p:set>
+                                      <p:cBhvr>
+                                        <p:cTn id="18" dur="1" fill="hold">
+                                          <p:stCondLst>
+                                            <p:cond delay="0"/>
+                                          </p:stCondLst>
+                                        </p:cTn>
+                                        <p:tgtEl>
+                                          <p:spTgt spid="3">
+                                            <p:txEl>
+                                              <p:pRg st="6" end="6"/>
+                                            </p:txEl>
+                                          </p:spTgt>
+                                        </p:tgtEl>
+                                        <p:attrNameLst>
+                                          <p:attrName>style.visibility</p:attrName>
+                                        </p:attrNameLst>
+                                      </p:cBhvr>
+                                      <p:to>
+                                        <p:strVal val="visible"/>
+                                      </p:to>
+                                    </p:set>
+                                  </p:childTnLst>
+                                </p:cTn>
+                              </p:par>
+                            </p:childTnLst>
+                          </p:cTn>
+                        </p:par>
+                      </p:childTnLst>
+                    </p:cTn>
+                  </p:par>
+                </p:childTnLst>
+              </p:cTn>
+              <p:prevCondLst>
+                <p:cond evt="onPrev" delay="0">
+                  <p:tgtEl>
+                    <p:sldTgt/>
+                  </p:tgtEl>
+                </p:cond>
+              </p:prevCondLst>
+              <p:nextCondLst>
+                <p:cond evt="onNext" delay="0">
+                  <p:tgtEl>
+                    <p:sldTgt/>
+                  </p:tgtEl>
+                </p:cond>
+              </p:nextCondLst>
+            </p:seq>
+          </p:childTnLst>
+        </p:cTn>
+      </p:par>
+    </p:tnLst>
+  </p:timing>
 </p:sld>
 </file>
 
@@ -3802,6 +4425,13 @@
   <p:clrMapOvr>
     <a:masterClrMapping/>
   </p:clrMapOvr>
+  <p:timing>
+    <p:tnLst>
+      <p:par>
+        <p:cTn id="1" dur="indefinite" restart="never" nodeType="tmRoot"/>
+      </p:par>
+    </p:tnLst>
+  </p:timing>
 </p:sld>
 </file>
 
@@ -3875,6 +4505,13 @@
   <p:clrMapOvr>
     <a:masterClrMapping/>
   </p:clrMapOvr>
+  <p:timing>
+    <p:tnLst>
+      <p:par>
+        <p:cTn id="1" dur="indefinite" restart="never" nodeType="tmRoot"/>
+      </p:par>
+    </p:tnLst>
+  </p:timing>
 </p:sld>
 </file>
 
@@ -4297,6 +4934,222 @@
   <p:clrMapOvr>
     <a:masterClrMapping/>
   </p:clrMapOvr>
+  <p:timing>
+    <p:tnLst>
+      <p:par>
+        <p:cTn id="1" dur="indefinite" restart="never" nodeType="tmRoot">
+          <p:childTnLst>
+            <p:seq concurrent="1" nextAc="seek">
+              <p:cTn id="2" dur="indefinite" nodeType="mainSeq">
+                <p:childTnLst>
+                  <p:par>
+                    <p:cTn id="3" fill="hold">
+                      <p:stCondLst>
+                        <p:cond delay="indefinite"/>
+                      </p:stCondLst>
+                      <p:childTnLst>
+                        <p:par>
+                          <p:cTn id="4" fill="hold">
+                            <p:stCondLst>
+                              <p:cond delay="0"/>
+                            </p:stCondLst>
+                            <p:childTnLst>
+                              <p:par>
+                                <p:cTn id="5" presetID="1" presetClass="entr" presetSubtype="0" fill="hold" grpId="0" nodeType="clickEffect">
+                                  <p:stCondLst>
+                                    <p:cond delay="0"/>
+                                  </p:stCondLst>
+                                  <p:childTnLst>
+                                    <p:set>
+                                      <p:cBhvr>
+                                        <p:cTn id="6" dur="1" fill="hold">
+                                          <p:stCondLst>
+                                            <p:cond delay="0"/>
+                                          </p:stCondLst>
+                                        </p:cTn>
+                                        <p:tgtEl>
+                                          <p:spTgt spid="5"/>
+                                        </p:tgtEl>
+                                        <p:attrNameLst>
+                                          <p:attrName>style.visibility</p:attrName>
+                                        </p:attrNameLst>
+                                      </p:cBhvr>
+                                      <p:to>
+                                        <p:strVal val="visible"/>
+                                      </p:to>
+                                    </p:set>
+                                  </p:childTnLst>
+                                </p:cTn>
+                              </p:par>
+                            </p:childTnLst>
+                          </p:cTn>
+                        </p:par>
+                      </p:childTnLst>
+                    </p:cTn>
+                  </p:par>
+                  <p:par>
+                    <p:cTn id="7" fill="hold">
+                      <p:stCondLst>
+                        <p:cond delay="indefinite"/>
+                      </p:stCondLst>
+                      <p:childTnLst>
+                        <p:par>
+                          <p:cTn id="8" fill="hold">
+                            <p:stCondLst>
+                              <p:cond delay="0"/>
+                            </p:stCondLst>
+                            <p:childTnLst>
+                              <p:par>
+                                <p:cTn id="9" presetID="1" presetClass="entr" presetSubtype="0" fill="hold" grpId="0" nodeType="clickEffect">
+                                  <p:stCondLst>
+                                    <p:cond delay="0"/>
+                                  </p:stCondLst>
+                                  <p:childTnLst>
+                                    <p:set>
+                                      <p:cBhvr>
+                                        <p:cTn id="10" dur="1" fill="hold">
+                                          <p:stCondLst>
+                                            <p:cond delay="0"/>
+                                          </p:stCondLst>
+                                        </p:cTn>
+                                        <p:tgtEl>
+                                          <p:spTgt spid="6"/>
+                                        </p:tgtEl>
+                                        <p:attrNameLst>
+                                          <p:attrName>style.visibility</p:attrName>
+                                        </p:attrNameLst>
+                                      </p:cBhvr>
+                                      <p:to>
+                                        <p:strVal val="visible"/>
+                                      </p:to>
+                                    </p:set>
+                                  </p:childTnLst>
+                                </p:cTn>
+                              </p:par>
+                            </p:childTnLst>
+                          </p:cTn>
+                        </p:par>
+                      </p:childTnLst>
+                    </p:cTn>
+                  </p:par>
+                  <p:par>
+                    <p:cTn id="11" fill="hold">
+                      <p:stCondLst>
+                        <p:cond delay="indefinite"/>
+                      </p:stCondLst>
+                      <p:childTnLst>
+                        <p:par>
+                          <p:cTn id="12" fill="hold">
+                            <p:stCondLst>
+                              <p:cond delay="0"/>
+                            </p:stCondLst>
+                            <p:childTnLst>
+                              <p:par>
+                                <p:cTn id="13" presetID="1" presetClass="entr" presetSubtype="0" fill="hold" grpId="0" nodeType="clickEffect">
+                                  <p:stCondLst>
+                                    <p:cond delay="0"/>
+                                  </p:stCondLst>
+                                  <p:childTnLst>
+                                    <p:set>
+                                      <p:cBhvr>
+                                        <p:cTn id="14" dur="1" fill="hold">
+                                          <p:stCondLst>
+                                            <p:cond delay="0"/>
+                                          </p:stCondLst>
+                                        </p:cTn>
+                                        <p:tgtEl>
+                                          <p:spTgt spid="7"/>
+                                        </p:tgtEl>
+                                        <p:attrNameLst>
+                                          <p:attrName>style.visibility</p:attrName>
+                                        </p:attrNameLst>
+                                      </p:cBhvr>
+                                      <p:to>
+                                        <p:strVal val="visible"/>
+                                      </p:to>
+                                    </p:set>
+                                  </p:childTnLst>
+                                </p:cTn>
+                              </p:par>
+                            </p:childTnLst>
+                          </p:cTn>
+                        </p:par>
+                      </p:childTnLst>
+                    </p:cTn>
+                  </p:par>
+                  <p:par>
+                    <p:cTn id="15" fill="hold">
+                      <p:stCondLst>
+                        <p:cond delay="indefinite"/>
+                      </p:stCondLst>
+                      <p:childTnLst>
+                        <p:par>
+                          <p:cTn id="16" fill="hold">
+                            <p:stCondLst>
+                              <p:cond delay="0"/>
+                            </p:stCondLst>
+                            <p:childTnLst>
+                              <p:par>
+                                <p:cTn id="17" presetID="1" presetClass="entr" presetSubtype="0" fill="hold" grpId="0" nodeType="clickEffect">
+                                  <p:stCondLst>
+                                    <p:cond delay="0"/>
+                                  </p:stCondLst>
+                                  <p:childTnLst>
+                                    <p:set>
+                                      <p:cBhvr>
+                                        <p:cTn id="18" dur="1" fill="hold">
+                                          <p:stCondLst>
+                                            <p:cond delay="0"/>
+                                          </p:stCondLst>
+                                        </p:cTn>
+                                        <p:tgtEl>
+                                          <p:spTgt spid="8"/>
+                                        </p:tgtEl>
+                                        <p:attrNameLst>
+                                          <p:attrName>style.visibility</p:attrName>
+                                        </p:attrNameLst>
+                                      </p:cBhvr>
+                                      <p:to>
+                                        <p:strVal val="visible"/>
+                                      </p:to>
+                                    </p:set>
+                                  </p:childTnLst>
+                                </p:cTn>
+                              </p:par>
+                            </p:childTnLst>
+                          </p:cTn>
+                        </p:par>
+                      </p:childTnLst>
+                    </p:cTn>
+                  </p:par>
+                </p:childTnLst>
+              </p:cTn>
+              <p:prevCondLst>
+                <p:cond evt="onPrev" delay="0">
+                  <p:tgtEl>
+                    <p:sldTgt/>
+                  </p:tgtEl>
+                </p:cond>
+              </p:prevCondLst>
+              <p:nextCondLst>
+                <p:cond evt="onNext" delay="0">
+                  <p:tgtEl>
+                    <p:sldTgt/>
+                  </p:tgtEl>
+                </p:cond>
+              </p:nextCondLst>
+            </p:seq>
+          </p:childTnLst>
+        </p:cTn>
+      </p:par>
+    </p:tnLst>
+    <p:bldLst>
+      <p:bldP spid="5" grpId="0"/>
+      <p:bldP spid="6" grpId="0"/>
+      <p:bldP spid="7" grpId="0"/>
+      <p:bldP spid="8" grpId="0"/>
+    </p:bldLst>
+  </p:timing>
 </p:sld>
 </file>
 

</xml_diff>